<commit_message>
Added the notepad form information
</commit_message>
<xml_diff>
--- a/App_Dev_Fianl_Project.pptx
+++ b/App_Dev_Fianl_Project.pptx
@@ -5,10 +5,10 @@
     <p:sldMasterId id="2147483648" r:id="rId1"/>
   </p:sldMasterIdLst>
   <p:notesMasterIdLst>
-    <p:notesMasterId r:id="rId19"/>
+    <p:notesMasterId r:id="rId22"/>
   </p:notesMasterIdLst>
   <p:handoutMasterIdLst>
-    <p:handoutMasterId r:id="rId20"/>
+    <p:handoutMasterId r:id="rId23"/>
   </p:handoutMasterIdLst>
   <p:sldIdLst>
     <p:sldId id="256" r:id="rId2"/>
@@ -27,7 +27,10 @@
     <p:sldId id="320" r:id="rId15"/>
     <p:sldId id="321" r:id="rId16"/>
     <p:sldId id="322" r:id="rId17"/>
-    <p:sldId id="323" r:id="rId18"/>
+    <p:sldId id="324" r:id="rId18"/>
+    <p:sldId id="325" r:id="rId19"/>
+    <p:sldId id="326" r:id="rId20"/>
+    <p:sldId id="323" r:id="rId21"/>
   </p:sldIdLst>
   <p:sldSz cx="12192000" cy="6858000"/>
   <p:notesSz cx="6858000" cy="9144000"/>
@@ -10680,12 +10683,41 @@
           <a:chExt cx="0" cy="0"/>
         </a:xfrm>
       </p:grpSpPr>
+      <p:pic>
+        <p:nvPicPr>
+          <p:cNvPr id="3" name="Picture 2">
+            <a:extLst>
+              <a:ext uri="{FF2B5EF4-FFF2-40B4-BE49-F238E27FC236}">
+                <a16:creationId xmlns:a16="http://schemas.microsoft.com/office/drawing/2014/main" id="{30CCF926-130A-480D-A7FF-211D11BAD657}"/>
+              </a:ext>
+            </a:extLst>
+          </p:cNvPr>
+          <p:cNvPicPr>
+            <a:picLocks noChangeAspect="1"/>
+          </p:cNvPicPr>
+          <p:nvPr/>
+        </p:nvPicPr>
+        <p:blipFill rotWithShape="1">
+          <a:blip r:embed="rId2"/>
+          <a:srcRect t="780"/>
+          <a:stretch/>
+        </p:blipFill>
+        <p:spPr>
+          <a:xfrm>
+            <a:off x="2013757" y="1616539"/>
+            <a:ext cx="7225839" cy="4552793"/>
+          </a:xfrm>
+          <a:prstGeom prst="rect">
+            <a:avLst/>
+          </a:prstGeom>
+        </p:spPr>
+      </p:pic>
       <p:sp>
         <p:nvSpPr>
-          <p:cNvPr id="11" name="TextBox 10">
+          <p:cNvPr id="5" name="TextBox 4">
             <a:extLst>
               <a:ext uri="{FF2B5EF4-FFF2-40B4-BE49-F238E27FC236}">
-                <a16:creationId xmlns:a16="http://schemas.microsoft.com/office/drawing/2014/main" id="{CD8B058F-67DF-4D09-8F9F-3A14D5F41538}"/>
+                <a16:creationId xmlns:a16="http://schemas.microsoft.com/office/drawing/2014/main" id="{39C25531-1383-407A-A26B-EBE9AF5D3470}"/>
               </a:ext>
             </a:extLst>
           </p:cNvPr>
@@ -10694,7 +10726,147 @@
         </p:nvSpPr>
         <p:spPr>
           <a:xfrm>
-            <a:off x="-162508" y="6120559"/>
+            <a:off x="604751" y="413852"/>
+            <a:ext cx="6097384" cy="523220"/>
+          </a:xfrm>
+          <a:prstGeom prst="rect">
+            <a:avLst/>
+          </a:prstGeom>
+          <a:noFill/>
+        </p:spPr>
+        <p:txBody>
+          <a:bodyPr wrap="square">
+            <a:spAutoFit/>
+          </a:bodyPr>
+          <a:lstStyle/>
+          <a:p>
+            <a:pPr marL="285750" marR="0" lvl="0" indent="-285750" algn="l" defTabSz="914400" rtl="0" eaLnBrk="0" fontAlgn="base" latinLnBrk="0" hangingPunct="0">
+              <a:lnSpc>
+                <a:spcPct val="100000"/>
+              </a:lnSpc>
+              <a:spcBef>
+                <a:spcPct val="0"/>
+              </a:spcBef>
+              <a:spcAft>
+                <a:spcPct val="0"/>
+              </a:spcAft>
+              <a:buClrTx/>
+              <a:buSzTx/>
+              <a:buFont typeface="Arial" panose="020B0604020202020204" pitchFamily="34" charset="0"/>
+              <a:buChar char="•"/>
+              <a:tabLst/>
+            </a:pPr>
+            <a:r>
+              <a:rPr kumimoji="0" lang="en-US" altLang="en-US" sz="2800" b="1" i="0" u="none" strike="noStrike" cap="none" normalizeH="0" baseline="0" dirty="0">
+                <a:ln>
+                  <a:noFill/>
+                </a:ln>
+                <a:effectLst>
+                  <a:outerShdw blurRad="38100" dist="38100" dir="2700000" algn="tl">
+                    <a:srgbClr val="000000">
+                      <a:alpha val="43137"/>
+                    </a:srgbClr>
+                  </a:outerShdw>
+                </a:effectLst>
+                <a:ea typeface="DengXian Light" panose="02010600030101010101" pitchFamily="2" charset="-122"/>
+                <a:cs typeface="Times New Roman" panose="02020603050405020304" pitchFamily="18" charset="0"/>
+              </a:rPr>
+              <a:t>Notepad Page</a:t>
+            </a:r>
+          </a:p>
+        </p:txBody>
+      </p:sp>
+      <p:sp>
+        <p:nvSpPr>
+          <p:cNvPr id="7" name="TextBox 6">
+            <a:extLst>
+              <a:ext uri="{FF2B5EF4-FFF2-40B4-BE49-F238E27FC236}">
+                <a16:creationId xmlns:a16="http://schemas.microsoft.com/office/drawing/2014/main" id="{1BC0741F-6336-4AB0-A511-729E3EFA059B}"/>
+              </a:ext>
+            </a:extLst>
+          </p:cNvPr>
+          <p:cNvSpPr txBox="1"/>
+          <p:nvPr/>
+        </p:nvSpPr>
+        <p:spPr>
+          <a:xfrm>
+            <a:off x="1884910" y="937072"/>
+            <a:ext cx="7225838" cy="584775"/>
+          </a:xfrm>
+          <a:prstGeom prst="rect">
+            <a:avLst/>
+          </a:prstGeom>
+          <a:noFill/>
+        </p:spPr>
+        <p:txBody>
+          <a:bodyPr wrap="square">
+            <a:spAutoFit/>
+          </a:bodyPr>
+          <a:lstStyle/>
+          <a:p>
+            <a:pPr marR="0" lvl="0" algn="l" defTabSz="914400" rtl="0" eaLnBrk="0" fontAlgn="base" latinLnBrk="0" hangingPunct="0">
+              <a:lnSpc>
+                <a:spcPct val="100000"/>
+              </a:lnSpc>
+              <a:spcBef>
+                <a:spcPct val="0"/>
+              </a:spcBef>
+              <a:spcAft>
+                <a:spcPct val="0"/>
+              </a:spcAft>
+              <a:buClrTx/>
+              <a:buSzTx/>
+              <a:tabLst/>
+            </a:pPr>
+            <a:r>
+              <a:rPr kumimoji="0" lang="en-US" altLang="en-US" sz="1600" i="0" u="none" strike="noStrike" cap="none" normalizeH="0" baseline="0" dirty="0">
+                <a:ln>
+                  <a:noFill/>
+                </a:ln>
+                <a:effectLst>
+                  <a:outerShdw blurRad="38100" dist="38100" dir="2700000" algn="tl">
+                    <a:srgbClr val="000000">
+                      <a:alpha val="43137"/>
+                    </a:srgbClr>
+                  </a:outerShdw>
+                </a:effectLst>
+                <a:ea typeface="DengXian Light" panose="02010600030101010101" pitchFamily="2" charset="-122"/>
+                <a:cs typeface="Times New Roman" panose="02020603050405020304" pitchFamily="18" charset="0"/>
+              </a:rPr>
+              <a:t>In the notepad page, user can create new file, open an existin</a:t>
+            </a:r>
+            <a:r>
+              <a:rPr lang="en-US" altLang="en-US" sz="1600" dirty="0">
+                <a:effectLst>
+                  <a:outerShdw blurRad="38100" dist="38100" dir="2700000" algn="tl">
+                    <a:srgbClr val="000000">
+                      <a:alpha val="43137"/>
+                    </a:srgbClr>
+                  </a:outerShdw>
+                </a:effectLst>
+                <a:ea typeface="DengXian Light" panose="02010600030101010101" pitchFamily="2" charset="-122"/>
+                <a:cs typeface="Times New Roman" panose="02020603050405020304" pitchFamily="18" charset="0"/>
+              </a:rPr>
+              <a:t>g file, edit the file and format the font and color of the text.</a:t>
+            </a:r>
+          </a:p>
+        </p:txBody>
+      </p:sp>
+      <p:sp>
+        <p:nvSpPr>
+          <p:cNvPr id="8" name="TextBox 7">
+            <a:extLst>
+              <a:ext uri="{FF2B5EF4-FFF2-40B4-BE49-F238E27FC236}">
+                <a16:creationId xmlns:a16="http://schemas.microsoft.com/office/drawing/2014/main" id="{A47432B2-AB61-442E-ADF1-ABE75F90E315}"/>
+              </a:ext>
+            </a:extLst>
+          </p:cNvPr>
+          <p:cNvSpPr txBox="1"/>
+          <p:nvPr/>
+        </p:nvSpPr>
+        <p:spPr>
+          <a:xfrm>
+            <a:off x="-541536" y="6420994"/>
             <a:ext cx="6097554" cy="374783"/>
           </a:xfrm>
           <a:prstGeom prst="rect">
@@ -10775,117 +10947,123 @@
           </a:p>
         </p:txBody>
       </p:sp>
-      <p:sp>
-        <p:nvSpPr>
-          <p:cNvPr id="3" name="Rectangle 3">
+    </p:spTree>
+    <p:extLst>
+      <p:ext uri="{BB962C8B-B14F-4D97-AF65-F5344CB8AC3E}">
+        <p14:creationId xmlns:p14="http://schemas.microsoft.com/office/powerpoint/2010/main" val="2945075065"/>
+      </p:ext>
+    </p:extLst>
+  </p:cSld>
+  <p:clrMapOvr>
+    <a:masterClrMapping/>
+  </p:clrMapOvr>
+</p:sld>
+</file>
+
+<file path=ppt/slides/slide18.xml><?xml version="1.0" encoding="utf-8"?>
+<p:sld xmlns:a="http://schemas.openxmlformats.org/drawingml/2006/main" xmlns:r="http://schemas.openxmlformats.org/officeDocument/2006/relationships" xmlns:p="http://schemas.openxmlformats.org/presentationml/2006/main">
+  <p:cSld>
+    <p:spTree>
+      <p:nvGrpSpPr>
+        <p:cNvPr id="1" name=""/>
+        <p:cNvGrpSpPr/>
+        <p:nvPr/>
+      </p:nvGrpSpPr>
+      <p:grpSpPr>
+        <a:xfrm>
+          <a:off x="0" y="0"/>
+          <a:ext cx="0" cy="0"/>
+          <a:chOff x="0" y="0"/>
+          <a:chExt cx="0" cy="0"/>
+        </a:xfrm>
+      </p:grpSpPr>
+      <p:pic>
+        <p:nvPicPr>
+          <p:cNvPr id="4" name="Picture 3">
             <a:extLst>
               <a:ext uri="{FF2B5EF4-FFF2-40B4-BE49-F238E27FC236}">
-                <a16:creationId xmlns:a16="http://schemas.microsoft.com/office/drawing/2014/main" id="{6ACAD754-04BC-48CD-97DA-931BFB570C41}"/>
+                <a16:creationId xmlns:a16="http://schemas.microsoft.com/office/drawing/2014/main" id="{8BFAF4CD-4357-4E12-B185-063313576228}"/>
               </a:ext>
             </a:extLst>
           </p:cNvPr>
-          <p:cNvSpPr>
-            <a:spLocks noChangeArrowheads="1"/>
-          </p:cNvSpPr>
+          <p:cNvPicPr>
+            <a:picLocks noChangeAspect="1"/>
+          </p:cNvPicPr>
+          <p:nvPr/>
+        </p:nvPicPr>
+        <p:blipFill rotWithShape="1">
+          <a:blip r:embed="rId2"/>
+          <a:srcRect l="-444" t="-444"/>
+          <a:stretch/>
+        </p:blipFill>
+        <p:spPr>
+          <a:xfrm>
+            <a:off x="551323" y="328352"/>
+            <a:ext cx="5203911" cy="3312622"/>
+          </a:xfrm>
+          <a:prstGeom prst="rect">
+            <a:avLst/>
+          </a:prstGeom>
+        </p:spPr>
+      </p:pic>
+      <p:pic>
+        <p:nvPicPr>
+          <p:cNvPr id="6" name="Picture 5">
+            <a:extLst>
+              <a:ext uri="{FF2B5EF4-FFF2-40B4-BE49-F238E27FC236}">
+                <a16:creationId xmlns:a16="http://schemas.microsoft.com/office/drawing/2014/main" id="{351372B4-43E0-42EA-9AAD-EF99244D239B}"/>
+              </a:ext>
+            </a:extLst>
+          </p:cNvPr>
+          <p:cNvPicPr>
+            <a:picLocks noChangeAspect="1"/>
+          </p:cNvPicPr>
+          <p:nvPr/>
+        </p:nvPicPr>
+        <p:blipFill rotWithShape="1">
+          <a:blip r:embed="rId3"/>
+          <a:srcRect t="546" b="-1"/>
+          <a:stretch/>
+        </p:blipFill>
+        <p:spPr>
+          <a:xfrm>
+            <a:off x="6001766" y="3119029"/>
+            <a:ext cx="5697100" cy="3627230"/>
+          </a:xfrm>
+          <a:prstGeom prst="rect">
+            <a:avLst/>
+          </a:prstGeom>
+        </p:spPr>
+      </p:pic>
+      <p:sp>
+        <p:nvSpPr>
+          <p:cNvPr id="10" name="TextBox 9">
+            <a:extLst>
+              <a:ext uri="{FF2B5EF4-FFF2-40B4-BE49-F238E27FC236}">
+                <a16:creationId xmlns:a16="http://schemas.microsoft.com/office/drawing/2014/main" id="{BB3BB675-6671-4079-99BA-96144CFECA50}"/>
+              </a:ext>
+            </a:extLst>
+          </p:cNvPr>
+          <p:cNvSpPr txBox="1"/>
           <p:nvPr/>
         </p:nvSpPr>
-        <p:spPr bwMode="auto">
-          <a:xfrm>
-            <a:off x="2369976" y="3798660"/>
-            <a:ext cx="8450424" cy="45719"/>
+        <p:spPr>
+          <a:xfrm>
+            <a:off x="1066689" y="3771980"/>
+            <a:ext cx="4403062" cy="1631216"/>
           </a:xfrm>
           <a:prstGeom prst="rect">
             <a:avLst/>
           </a:prstGeom>
           <a:noFill/>
-          <a:ln>
-            <a:noFill/>
-          </a:ln>
-          <a:effectLst/>
-          <a:extLst>
-            <a:ext uri="{909E8E84-426E-40DD-AFC4-6F175D3DCCD1}">
-              <a14:hiddenFill xmlns:a14="http://schemas.microsoft.com/office/drawing/2010/main">
-                <a:solidFill>
-                  <a:schemeClr val="accent1"/>
-                </a:solidFill>
-              </a14:hiddenFill>
-            </a:ext>
-            <a:ext uri="{91240B29-F687-4F45-9708-019B960494DF}">
-              <a14:hiddenLine xmlns:a14="http://schemas.microsoft.com/office/drawing/2010/main" w="9525">
-                <a:solidFill>
-                  <a:schemeClr val="tx1"/>
-                </a:solidFill>
-                <a:miter lim="800000"/>
-                <a:headEnd/>
-                <a:tailEnd/>
-              </a14:hiddenLine>
-            </a:ext>
-            <a:ext uri="{AF507438-7753-43E0-B8FC-AC1667EBCBE1}">
-              <a14:hiddenEffects xmlns:a14="http://schemas.microsoft.com/office/drawing/2010/main">
-                <a:effectLst>
-                  <a:outerShdw dist="35921" dir="2700000" algn="ctr" rotWithShape="0">
-                    <a:schemeClr val="bg2"/>
-                  </a:outerShdw>
-                </a:effectLst>
-              </a14:hiddenEffects>
-            </a:ext>
-          </a:extLst>
         </p:spPr>
         <p:txBody>
-          <a:bodyPr vert="horz" wrap="square" lIns="91440" tIns="45720" rIns="91440" bIns="45720" numCol="1" anchor="ctr" anchorCtr="0" compatLnSpc="1">
-            <a:prstTxWarp prst="textNoShape">
-              <a:avLst/>
-            </a:prstTxWarp>
+          <a:bodyPr wrap="square">
             <a:spAutoFit/>
           </a:bodyPr>
           <a:lstStyle/>
           <a:p>
-            <a:endParaRPr lang="en-US"/>
-          </a:p>
-        </p:txBody>
-      </p:sp>
-      <p:sp>
-        <p:nvSpPr>
-          <p:cNvPr id="2" name="Rectangle 2">
-            <a:extLst>
-              <a:ext uri="{FF2B5EF4-FFF2-40B4-BE49-F238E27FC236}">
-                <a16:creationId xmlns:a16="http://schemas.microsoft.com/office/drawing/2014/main" id="{DB30CECD-8F7F-4342-8063-840C3A98EF28}"/>
-              </a:ext>
-            </a:extLst>
-          </p:cNvPr>
-          <p:cNvSpPr>
-            <a:spLocks noChangeArrowheads="1"/>
-          </p:cNvSpPr>
-          <p:nvPr/>
-        </p:nvSpPr>
-        <p:spPr bwMode="auto">
-          <a:xfrm>
-            <a:off x="1551213" y="2505342"/>
-            <a:ext cx="8563170" cy="1107996"/>
-          </a:xfrm>
-          <a:prstGeom prst="rect">
-            <a:avLst/>
-          </a:prstGeom>
-          <a:solidFill>
-            <a:schemeClr val="accent1">
-              <a:lumMod val="75000"/>
-            </a:schemeClr>
-          </a:solidFill>
-          <a:ln>
-            <a:noFill/>
-          </a:ln>
-          <a:effectLst/>
-        </p:spPr>
-        <p:txBody>
-          <a:bodyPr vert="horz" wrap="square" lIns="91440" tIns="45720" rIns="91440" bIns="45720" numCol="1" anchor="ctr" anchorCtr="0" compatLnSpc="1">
-            <a:prstTxWarp prst="textNoShape">
-              <a:avLst/>
-            </a:prstTxWarp>
-            <a:spAutoFit/>
-          </a:bodyPr>
-          <a:lstStyle/>
-          <a:p>
-            <a:pPr marL="0" marR="0" lvl="0" indent="0" algn="l" defTabSz="914400" rtl="0" eaLnBrk="0" fontAlgn="base" latinLnBrk="0" hangingPunct="0">
+            <a:pPr marR="0" lvl="0" algn="l" defTabSz="914400" rtl="0" eaLnBrk="0" fontAlgn="base" latinLnBrk="0" hangingPunct="0">
               <a:lnSpc>
                 <a:spcPct val="100000"/>
               </a:lnSpc>
@@ -10897,121 +11075,809 @@
               </a:spcAft>
               <a:buClrTx/>
               <a:buSzTx/>
-              <a:buFontTx/>
-              <a:buNone/>
               <a:tabLst/>
             </a:pPr>
             <a:r>
-              <a:rPr kumimoji="0" lang="en-US" altLang="en-US" sz="6600" b="0" i="0" u="none" strike="noStrike" cap="none" normalizeH="0" baseline="0" dirty="0">
-                <a:ln>
-                  <a:noFill/>
-                </a:ln>
-                <a:solidFill>
-                  <a:srgbClr val="E4B194"/>
-                </a:solidFill>
-                <a:effectLst/>
-                <a:ea typeface="DengXian" panose="02010600030101010101" pitchFamily="2" charset="-122"/>
-                <a:cs typeface="Calibri" panose="020F0502020204030204" pitchFamily="34" charset="0"/>
+              <a:rPr lang="en-US" altLang="en-US" sz="2800" dirty="0">
+                <a:effectLst>
+                  <a:outerShdw blurRad="38100" dist="38100" dir="2700000" algn="tl">
+                    <a:srgbClr val="000000">
+                      <a:alpha val="43137"/>
+                    </a:srgbClr>
+                  </a:outerShdw>
+                </a:effectLst>
+                <a:ea typeface="DengXian Light" panose="02010600030101010101" pitchFamily="2" charset="-122"/>
+                <a:cs typeface="Times New Roman" panose="02020603050405020304" pitchFamily="18" charset="0"/>
               </a:rPr>
-              <a:t>	  “ </a:t>
-            </a:r>
-            <a:r>
-              <a:rPr kumimoji="0" lang="en-US" altLang="en-US" sz="6600" b="0" i="0" u="none" strike="noStrike" cap="none" normalizeH="0" baseline="0" dirty="0">
-                <a:ln>
-                  <a:noFill/>
-                </a:ln>
-                <a:solidFill>
-                  <a:schemeClr val="bg1"/>
-                </a:solidFill>
-                <a:effectLst/>
-                <a:latin typeface="Arial Black" panose="020B0A04020102020204" pitchFamily="34" charset="0"/>
-                <a:ea typeface="DengXian" panose="02010600030101010101" pitchFamily="2" charset="-122"/>
-                <a:cs typeface="Calibri" panose="020F0502020204030204" pitchFamily="34" charset="0"/>
+              <a:t>File </a:t>
+            </a:r>
+          </a:p>
+          <a:p>
+            <a:pPr marL="742950" lvl="1" indent="-285750" eaLnBrk="0" fontAlgn="base" hangingPunct="0">
+              <a:spcBef>
+                <a:spcPct val="0"/>
+              </a:spcBef>
+              <a:spcAft>
+                <a:spcPct val="0"/>
+              </a:spcAft>
+              <a:buFont typeface="Arial" panose="020B0604020202020204" pitchFamily="34" charset="0"/>
+              <a:buChar char="•"/>
+            </a:pPr>
+            <a:r>
+              <a:rPr lang="en-US" altLang="en-US" dirty="0">
+                <a:effectLst>
+                  <a:outerShdw blurRad="38100" dist="38100" dir="2700000" algn="tl">
+                    <a:srgbClr val="000000">
+                      <a:alpha val="43137"/>
+                    </a:srgbClr>
+                  </a:outerShdw>
+                </a:effectLst>
+                <a:ea typeface="DengXian Light" panose="02010600030101010101" pitchFamily="2" charset="-122"/>
+                <a:cs typeface="Times New Roman" panose="02020603050405020304" pitchFamily="18" charset="0"/>
               </a:rPr>
-              <a:t>Thank You </a:t>
-            </a:r>
-            <a:r>
-              <a:rPr kumimoji="0" lang="en-US" altLang="en-US" sz="6600" b="0" i="0" u="none" strike="noStrike" cap="none" normalizeH="0" baseline="0" dirty="0">
-                <a:ln>
-                  <a:noFill/>
-                </a:ln>
-                <a:solidFill>
-                  <a:srgbClr val="E4B194"/>
-                </a:solidFill>
-                <a:effectLst/>
-                <a:ea typeface="DengXian" panose="02010600030101010101" pitchFamily="2" charset="-122"/>
-                <a:cs typeface="Calibri" panose="020F0502020204030204" pitchFamily="34" charset="0"/>
+              <a:t>New – create new note</a:t>
+            </a:r>
+          </a:p>
+          <a:p>
+            <a:pPr marL="742950" lvl="1" indent="-285750" eaLnBrk="0" fontAlgn="base" hangingPunct="0">
+              <a:spcBef>
+                <a:spcPct val="0"/>
+              </a:spcBef>
+              <a:spcAft>
+                <a:spcPct val="0"/>
+              </a:spcAft>
+              <a:buFont typeface="Arial" panose="020B0604020202020204" pitchFamily="34" charset="0"/>
+              <a:buChar char="•"/>
+            </a:pPr>
+            <a:r>
+              <a:rPr lang="en-US" altLang="en-US" dirty="0">
+                <a:effectLst>
+                  <a:outerShdw blurRad="38100" dist="38100" dir="2700000" algn="tl">
+                    <a:srgbClr val="000000">
+                      <a:alpha val="43137"/>
+                    </a:srgbClr>
+                  </a:outerShdw>
+                </a:effectLst>
+                <a:ea typeface="DengXian Light" panose="02010600030101010101" pitchFamily="2" charset="-122"/>
+                <a:cs typeface="Times New Roman" panose="02020603050405020304" pitchFamily="18" charset="0"/>
               </a:rPr>
-              <a:t>”</a:t>
-            </a:r>
-            <a:endParaRPr kumimoji="0" lang="en-US" altLang="en-US" sz="4000" b="0" i="0" u="none" strike="noStrike" cap="none" normalizeH="0" baseline="0" dirty="0">
-              <a:ln>
-                <a:noFill/>
-              </a:ln>
-              <a:solidFill>
-                <a:srgbClr val="E4B194"/>
-              </a:solidFill>
-              <a:effectLst/>
-            </a:endParaRPr>
+              <a:t>Open – open an existing file</a:t>
+            </a:r>
+          </a:p>
+          <a:p>
+            <a:pPr marL="742950" lvl="1" indent="-285750" eaLnBrk="0" fontAlgn="base" hangingPunct="0">
+              <a:spcBef>
+                <a:spcPct val="0"/>
+              </a:spcBef>
+              <a:spcAft>
+                <a:spcPct val="0"/>
+              </a:spcAft>
+              <a:buFont typeface="Arial" panose="020B0604020202020204" pitchFamily="34" charset="0"/>
+              <a:buChar char="•"/>
+            </a:pPr>
+            <a:r>
+              <a:rPr lang="en-US" altLang="en-US" dirty="0">
+                <a:effectLst>
+                  <a:outerShdw blurRad="38100" dist="38100" dir="2700000" algn="tl">
+                    <a:srgbClr val="000000">
+                      <a:alpha val="43137"/>
+                    </a:srgbClr>
+                  </a:outerShdw>
+                </a:effectLst>
+                <a:ea typeface="DengXian Light" panose="02010600030101010101" pitchFamily="2" charset="-122"/>
+                <a:cs typeface="Times New Roman" panose="02020603050405020304" pitchFamily="18" charset="0"/>
+              </a:rPr>
+              <a:t>Save – save current note</a:t>
+            </a:r>
+          </a:p>
+          <a:p>
+            <a:pPr marL="742950" lvl="1" indent="-285750" eaLnBrk="0" fontAlgn="base" hangingPunct="0">
+              <a:spcBef>
+                <a:spcPct val="0"/>
+              </a:spcBef>
+              <a:spcAft>
+                <a:spcPct val="0"/>
+              </a:spcAft>
+              <a:buFont typeface="Arial" panose="020B0604020202020204" pitchFamily="34" charset="0"/>
+              <a:buChar char="•"/>
+            </a:pPr>
+            <a:r>
+              <a:rPr lang="en-US" altLang="en-US" dirty="0">
+                <a:effectLst>
+                  <a:outerShdw blurRad="38100" dist="38100" dir="2700000" algn="tl">
+                    <a:srgbClr val="000000">
+                      <a:alpha val="43137"/>
+                    </a:srgbClr>
+                  </a:outerShdw>
+                </a:effectLst>
+                <a:ea typeface="DengXian Light" panose="02010600030101010101" pitchFamily="2" charset="-122"/>
+                <a:cs typeface="Times New Roman" panose="02020603050405020304" pitchFamily="18" charset="0"/>
+              </a:rPr>
+              <a:t>Exit – exit the notepad</a:t>
+            </a:r>
           </a:p>
         </p:txBody>
       </p:sp>
       <p:sp>
         <p:nvSpPr>
-          <p:cNvPr id="6" name="Rectangle 5">
+          <p:cNvPr id="12" name="TextBox 11">
             <a:extLst>
               <a:ext uri="{FF2B5EF4-FFF2-40B4-BE49-F238E27FC236}">
-                <a16:creationId xmlns:a16="http://schemas.microsoft.com/office/drawing/2014/main" id="{C5D34516-6D94-4451-A0D4-5473019DEE56}"/>
+                <a16:creationId xmlns:a16="http://schemas.microsoft.com/office/drawing/2014/main" id="{4491159D-11B4-42EA-83DD-902152BAA0B5}"/>
               </a:ext>
             </a:extLst>
           </p:cNvPr>
-          <p:cNvSpPr/>
+          <p:cNvSpPr txBox="1"/>
           <p:nvPr/>
         </p:nvSpPr>
         <p:spPr>
           <a:xfrm>
-            <a:off x="354563" y="223316"/>
-            <a:ext cx="11430001" cy="6411367"/>
+            <a:off x="5469751" y="197346"/>
+            <a:ext cx="6097384" cy="3231654"/>
           </a:xfrm>
           <a:prstGeom prst="rect">
             <a:avLst/>
           </a:prstGeom>
           <a:noFill/>
-          <a:ln w="76200">
-            <a:solidFill>
-              <a:srgbClr val="CBBA99"/>
-            </a:solidFill>
-          </a:ln>
-        </p:spPr>
-        <p:style>
-          <a:lnRef idx="2">
-            <a:schemeClr val="accent1">
-              <a:shade val="50000"/>
-            </a:schemeClr>
-          </a:lnRef>
-          <a:fillRef idx="1">
-            <a:schemeClr val="accent1"/>
-          </a:fillRef>
-          <a:effectRef idx="0">
-            <a:schemeClr val="accent1"/>
-          </a:effectRef>
-          <a:fontRef idx="minor">
-            <a:schemeClr val="lt1"/>
-          </a:fontRef>
-        </p:style>
+        </p:spPr>
         <p:txBody>
-          <a:bodyPr rtlCol="0" anchor="ctr"/>
+          <a:bodyPr wrap="square">
+            <a:spAutoFit/>
+          </a:bodyPr>
           <a:lstStyle/>
           <a:p>
-            <a:pPr algn="ctr"/>
-            <a:endParaRPr lang="en-US"/>
+            <a:pPr lvl="1" eaLnBrk="0" fontAlgn="base" hangingPunct="0">
+              <a:spcBef>
+                <a:spcPct val="0"/>
+              </a:spcBef>
+              <a:spcAft>
+                <a:spcPct val="0"/>
+              </a:spcAft>
+            </a:pPr>
+            <a:r>
+              <a:rPr lang="en-US" altLang="en-US" sz="2800" dirty="0">
+                <a:effectLst>
+                  <a:outerShdw blurRad="38100" dist="38100" dir="2700000" algn="tl">
+                    <a:srgbClr val="000000">
+                      <a:alpha val="43137"/>
+                    </a:srgbClr>
+                  </a:outerShdw>
+                </a:effectLst>
+                <a:ea typeface="DengXian Light" panose="02010600030101010101" pitchFamily="2" charset="-122"/>
+                <a:cs typeface="Times New Roman" panose="02020603050405020304" pitchFamily="18" charset="0"/>
+              </a:rPr>
+              <a:t>Edit</a:t>
+            </a:r>
+          </a:p>
+          <a:p>
+            <a:pPr marL="1200150" lvl="2" indent="-285750" eaLnBrk="0" fontAlgn="base" hangingPunct="0">
+              <a:spcBef>
+                <a:spcPct val="0"/>
+              </a:spcBef>
+              <a:spcAft>
+                <a:spcPct val="0"/>
+              </a:spcAft>
+              <a:buFont typeface="Arial" panose="020B0604020202020204" pitchFamily="34" charset="0"/>
+              <a:buChar char="•"/>
+            </a:pPr>
+            <a:r>
+              <a:rPr lang="en-US" altLang="en-US" sz="1600" dirty="0">
+                <a:effectLst>
+                  <a:outerShdw blurRad="38100" dist="38100" dir="2700000" algn="tl">
+                    <a:srgbClr val="000000">
+                      <a:alpha val="43137"/>
+                    </a:srgbClr>
+                  </a:outerShdw>
+                </a:effectLst>
+                <a:ea typeface="DengXian Light" panose="02010600030101010101" pitchFamily="2" charset="-122"/>
+                <a:cs typeface="Times New Roman" panose="02020603050405020304" pitchFamily="18" charset="0"/>
+              </a:rPr>
+              <a:t>Undo – </a:t>
+            </a:r>
+            <a:r>
+              <a:rPr lang="en-US" sz="1600" b="1" dirty="0"/>
+              <a:t>reverse the action of an earlier action</a:t>
+            </a:r>
+          </a:p>
+          <a:p>
+            <a:pPr marL="1200150" lvl="2" indent="-285750" eaLnBrk="0" fontAlgn="base" hangingPunct="0">
+              <a:spcBef>
+                <a:spcPct val="0"/>
+              </a:spcBef>
+              <a:spcAft>
+                <a:spcPct val="0"/>
+              </a:spcAft>
+              <a:buFont typeface="Arial" panose="020B0604020202020204" pitchFamily="34" charset="0"/>
+              <a:buChar char="•"/>
+            </a:pPr>
+            <a:r>
+              <a:rPr lang="en-US" altLang="en-US" sz="1600" dirty="0">
+                <a:effectLst>
+                  <a:outerShdw blurRad="38100" dist="38100" dir="2700000" algn="tl">
+                    <a:srgbClr val="000000">
+                      <a:alpha val="43137"/>
+                    </a:srgbClr>
+                  </a:outerShdw>
+                </a:effectLst>
+                <a:ea typeface="DengXian Light" panose="02010600030101010101" pitchFamily="2" charset="-122"/>
+                <a:cs typeface="Times New Roman" panose="02020603050405020304" pitchFamily="18" charset="0"/>
+              </a:rPr>
+              <a:t>Redo – </a:t>
+            </a:r>
+            <a:r>
+              <a:rPr lang="en-US" sz="1600" dirty="0"/>
+              <a:t>restores any actions that were previously undone using an undo</a:t>
+            </a:r>
+            <a:r>
+              <a:rPr lang="en-US" altLang="en-US" sz="1600" dirty="0">
+                <a:effectLst>
+                  <a:outerShdw blurRad="38100" dist="38100" dir="2700000" algn="tl">
+                    <a:srgbClr val="000000">
+                      <a:alpha val="43137"/>
+                    </a:srgbClr>
+                  </a:outerShdw>
+                </a:effectLst>
+                <a:ea typeface="DengXian Light" panose="02010600030101010101" pitchFamily="2" charset="-122"/>
+                <a:cs typeface="Times New Roman" panose="02020603050405020304" pitchFamily="18" charset="0"/>
+              </a:rPr>
+              <a:t> </a:t>
+            </a:r>
+          </a:p>
+          <a:p>
+            <a:pPr marL="1200150" lvl="2" indent="-285750" eaLnBrk="0" fontAlgn="base" hangingPunct="0">
+              <a:spcBef>
+                <a:spcPct val="0"/>
+              </a:spcBef>
+              <a:spcAft>
+                <a:spcPct val="0"/>
+              </a:spcAft>
+              <a:buFont typeface="Arial" panose="020B0604020202020204" pitchFamily="34" charset="0"/>
+              <a:buChar char="•"/>
+            </a:pPr>
+            <a:r>
+              <a:rPr lang="en-US" altLang="en-US" sz="1600" dirty="0">
+                <a:effectLst>
+                  <a:outerShdw blurRad="38100" dist="38100" dir="2700000" algn="tl">
+                    <a:srgbClr val="000000">
+                      <a:alpha val="43137"/>
+                    </a:srgbClr>
+                  </a:outerShdw>
+                </a:effectLst>
+                <a:ea typeface="DengXian Light" panose="02010600030101010101" pitchFamily="2" charset="-122"/>
+                <a:cs typeface="Times New Roman" panose="02020603050405020304" pitchFamily="18" charset="0"/>
+              </a:rPr>
+              <a:t>Cut – </a:t>
+            </a:r>
+            <a:r>
+              <a:rPr lang="en-US" sz="1600" dirty="0"/>
+              <a:t>removes the currently selected text and places it on the clipboard</a:t>
+            </a:r>
+            <a:endParaRPr lang="en-US" altLang="en-US" sz="1600" dirty="0">
+              <a:effectLst>
+                <a:outerShdw blurRad="38100" dist="38100" dir="2700000" algn="tl">
+                  <a:srgbClr val="000000">
+                    <a:alpha val="43137"/>
+                  </a:srgbClr>
+                </a:outerShdw>
+              </a:effectLst>
+              <a:ea typeface="DengXian Light" panose="02010600030101010101" pitchFamily="2" charset="-122"/>
+              <a:cs typeface="Times New Roman" panose="02020603050405020304" pitchFamily="18" charset="0"/>
+            </a:endParaRPr>
+          </a:p>
+          <a:p>
+            <a:pPr marL="1200150" lvl="2" indent="-285750" eaLnBrk="0" fontAlgn="base" hangingPunct="0">
+              <a:spcBef>
+                <a:spcPct val="0"/>
+              </a:spcBef>
+              <a:spcAft>
+                <a:spcPct val="0"/>
+              </a:spcAft>
+              <a:buFont typeface="Arial" panose="020B0604020202020204" pitchFamily="34" charset="0"/>
+              <a:buChar char="•"/>
+            </a:pPr>
+            <a:r>
+              <a:rPr lang="en-US" altLang="en-US" sz="1600" dirty="0">
+                <a:effectLst>
+                  <a:outerShdw blurRad="38100" dist="38100" dir="2700000" algn="tl">
+                    <a:srgbClr val="000000">
+                      <a:alpha val="43137"/>
+                    </a:srgbClr>
+                  </a:outerShdw>
+                </a:effectLst>
+                <a:ea typeface="DengXian Light" panose="02010600030101010101" pitchFamily="2" charset="-122"/>
+                <a:cs typeface="Times New Roman" panose="02020603050405020304" pitchFamily="18" charset="0"/>
+              </a:rPr>
+              <a:t>Copy – copies the selected text </a:t>
+            </a:r>
+          </a:p>
+          <a:p>
+            <a:pPr marL="1200150" lvl="2" indent="-285750" eaLnBrk="0" fontAlgn="base" hangingPunct="0">
+              <a:spcBef>
+                <a:spcPct val="0"/>
+              </a:spcBef>
+              <a:spcAft>
+                <a:spcPct val="0"/>
+              </a:spcAft>
+              <a:buFont typeface="Arial" panose="020B0604020202020204" pitchFamily="34" charset="0"/>
+              <a:buChar char="•"/>
+            </a:pPr>
+            <a:r>
+              <a:rPr lang="en-US" altLang="en-US" sz="1600" dirty="0">
+                <a:effectLst>
+                  <a:outerShdw blurRad="38100" dist="38100" dir="2700000" algn="tl">
+                    <a:srgbClr val="000000">
+                      <a:alpha val="43137"/>
+                    </a:srgbClr>
+                  </a:outerShdw>
+                </a:effectLst>
+                <a:ea typeface="DengXian Light" panose="02010600030101010101" pitchFamily="2" charset="-122"/>
+                <a:cs typeface="Times New Roman" panose="02020603050405020304" pitchFamily="18" charset="0"/>
+              </a:rPr>
+              <a:t>Paste – paste the copied text</a:t>
+            </a:r>
+          </a:p>
+          <a:p>
+            <a:pPr marL="1200150" lvl="2" indent="-285750" eaLnBrk="0" fontAlgn="base" hangingPunct="0">
+              <a:spcBef>
+                <a:spcPct val="0"/>
+              </a:spcBef>
+              <a:spcAft>
+                <a:spcPct val="0"/>
+              </a:spcAft>
+              <a:buFont typeface="Arial" panose="020B0604020202020204" pitchFamily="34" charset="0"/>
+              <a:buChar char="•"/>
+            </a:pPr>
+            <a:r>
+              <a:rPr lang="en-US" altLang="en-US" sz="1600" dirty="0">
+                <a:effectLst>
+                  <a:outerShdw blurRad="38100" dist="38100" dir="2700000" algn="tl">
+                    <a:srgbClr val="000000">
+                      <a:alpha val="43137"/>
+                    </a:srgbClr>
+                  </a:outerShdw>
+                </a:effectLst>
+                <a:ea typeface="DengXian Light" panose="02010600030101010101" pitchFamily="2" charset="-122"/>
+                <a:cs typeface="Times New Roman" panose="02020603050405020304" pitchFamily="18" charset="0"/>
+              </a:rPr>
+              <a:t>Select All – select all the text</a:t>
+            </a:r>
+          </a:p>
+          <a:p>
+            <a:pPr marL="1200150" lvl="2" indent="-285750" eaLnBrk="0" fontAlgn="base" hangingPunct="0">
+              <a:spcBef>
+                <a:spcPct val="0"/>
+              </a:spcBef>
+              <a:spcAft>
+                <a:spcPct val="0"/>
+              </a:spcAft>
+              <a:buFont typeface="Arial" panose="020B0604020202020204" pitchFamily="34" charset="0"/>
+              <a:buChar char="•"/>
+            </a:pPr>
+            <a:r>
+              <a:rPr lang="en-US" altLang="en-US" sz="1600" dirty="0">
+                <a:effectLst>
+                  <a:outerShdw blurRad="38100" dist="38100" dir="2700000" algn="tl">
+                    <a:srgbClr val="000000">
+                      <a:alpha val="43137"/>
+                    </a:srgbClr>
+                  </a:outerShdw>
+                </a:effectLst>
+                <a:ea typeface="DengXian Light" panose="02010600030101010101" pitchFamily="2" charset="-122"/>
+                <a:cs typeface="Times New Roman" panose="02020603050405020304" pitchFamily="18" charset="0"/>
+              </a:rPr>
+              <a:t>Date/Time – inserts the current date and time</a:t>
+            </a:r>
+          </a:p>
+          <a:p>
+            <a:pPr marL="742950" lvl="1" indent="-285750" eaLnBrk="0" fontAlgn="base" hangingPunct="0">
+              <a:spcBef>
+                <a:spcPct val="0"/>
+              </a:spcBef>
+              <a:spcAft>
+                <a:spcPct val="0"/>
+              </a:spcAft>
+              <a:buFont typeface="Arial" panose="020B0604020202020204" pitchFamily="34" charset="0"/>
+              <a:buChar char="•"/>
+            </a:pPr>
+            <a:endParaRPr lang="en-US" altLang="en-US" sz="1600" dirty="0">
+              <a:effectLst>
+                <a:outerShdw blurRad="38100" dist="38100" dir="2700000" algn="tl">
+                  <a:srgbClr val="000000">
+                    <a:alpha val="43137"/>
+                  </a:srgbClr>
+                </a:outerShdw>
+              </a:effectLst>
+              <a:ea typeface="DengXian Light" panose="02010600030101010101" pitchFamily="2" charset="-122"/>
+              <a:cs typeface="Times New Roman" panose="02020603050405020304" pitchFamily="18" charset="0"/>
+            </a:endParaRPr>
+          </a:p>
+          <a:p>
+            <a:pPr lvl="1" eaLnBrk="0" fontAlgn="base" hangingPunct="0">
+              <a:spcBef>
+                <a:spcPct val="0"/>
+              </a:spcBef>
+              <a:spcAft>
+                <a:spcPct val="0"/>
+              </a:spcAft>
+            </a:pPr>
+            <a:endParaRPr lang="en-US" altLang="en-US" sz="1600" dirty="0">
+              <a:effectLst>
+                <a:outerShdw blurRad="38100" dist="38100" dir="2700000" algn="tl">
+                  <a:srgbClr val="000000">
+                    <a:alpha val="43137"/>
+                  </a:srgbClr>
+                </a:outerShdw>
+              </a:effectLst>
+              <a:ea typeface="DengXian Light" panose="02010600030101010101" pitchFamily="2" charset="-122"/>
+              <a:cs typeface="Times New Roman" panose="02020603050405020304" pitchFamily="18" charset="0"/>
+            </a:endParaRPr>
+          </a:p>
+        </p:txBody>
+      </p:sp>
+      <p:sp>
+        <p:nvSpPr>
+          <p:cNvPr id="13" name="TextBox 12">
+            <a:extLst>
+              <a:ext uri="{FF2B5EF4-FFF2-40B4-BE49-F238E27FC236}">
+                <a16:creationId xmlns:a16="http://schemas.microsoft.com/office/drawing/2014/main" id="{B4F6F366-96DB-4FFF-8E94-B583D863B16A}"/>
+              </a:ext>
+            </a:extLst>
+          </p:cNvPr>
+          <p:cNvSpPr txBox="1"/>
+          <p:nvPr/>
+        </p:nvSpPr>
+        <p:spPr>
+          <a:xfrm>
+            <a:off x="-627803" y="6371476"/>
+            <a:ext cx="6097554" cy="374783"/>
+          </a:xfrm>
+          <a:prstGeom prst="rect">
+            <a:avLst/>
+          </a:prstGeom>
+          <a:noFill/>
+        </p:spPr>
+        <p:txBody>
+          <a:bodyPr wrap="square">
+            <a:spAutoFit/>
+          </a:bodyPr>
+          <a:lstStyle/>
+          <a:p>
+            <a:pPr algn="ctr">
+              <a:lnSpc>
+                <a:spcPct val="107000"/>
+              </a:lnSpc>
+              <a:spcAft>
+                <a:spcPts val="800"/>
+              </a:spcAft>
+            </a:pPr>
+            <a:r>
+              <a:rPr lang="en-US" sz="1800" dirty="0">
+                <a:solidFill>
+                  <a:schemeClr val="tx1">
+                    <a:lumMod val="50000"/>
+                    <a:lumOff val="50000"/>
+                  </a:schemeClr>
+                </a:solidFill>
+                <a:effectLst/>
+                <a:latin typeface="Abadi" panose="020B0604020104020204" pitchFamily="34" charset="0"/>
+                <a:ea typeface="DengXian" panose="02010600030101010101" pitchFamily="2" charset="-122"/>
+                <a:cs typeface="Arial" panose="020B0604020202020204" pitchFamily="34" charset="0"/>
+              </a:rPr>
+              <a:t>Vanier College</a:t>
+            </a:r>
+            <a:r>
+              <a:rPr lang="en-US" sz="1100" dirty="0">
+                <a:solidFill>
+                  <a:schemeClr val="tx1">
+                    <a:lumMod val="50000"/>
+                    <a:lumOff val="50000"/>
+                  </a:schemeClr>
+                </a:solidFill>
+                <a:latin typeface="Abadi" panose="020B0604020104020204" pitchFamily="34" charset="0"/>
+                <a:ea typeface="DengXian" panose="02010600030101010101" pitchFamily="2" charset="-122"/>
+                <a:cs typeface="Arial" panose="020B0604020202020204" pitchFamily="34" charset="0"/>
+              </a:rPr>
+              <a:t> </a:t>
+            </a:r>
+            <a:r>
+              <a:rPr lang="en-US" sz="1800" dirty="0">
+                <a:solidFill>
+                  <a:schemeClr val="tx1">
+                    <a:lumMod val="50000"/>
+                    <a:lumOff val="50000"/>
+                  </a:schemeClr>
+                </a:solidFill>
+                <a:effectLst/>
+                <a:latin typeface="Abadi" panose="020B0604020104020204" pitchFamily="34" charset="0"/>
+                <a:ea typeface="DengXian" panose="02010600030101010101" pitchFamily="2" charset="-122"/>
+                <a:cs typeface="Arial" panose="020B0604020202020204" pitchFamily="34" charset="0"/>
+              </a:rPr>
+              <a:t>Computer Science Department</a:t>
+            </a:r>
+            <a:endParaRPr lang="en-US" sz="1100" dirty="0">
+              <a:solidFill>
+                <a:schemeClr val="tx1">
+                  <a:lumMod val="50000"/>
+                  <a:lumOff val="50000"/>
+                </a:schemeClr>
+              </a:solidFill>
+              <a:effectLst/>
+              <a:latin typeface="Abadi" panose="020B0604020104020204" pitchFamily="34" charset="0"/>
+              <a:ea typeface="DengXian" panose="02010600030101010101" pitchFamily="2" charset="-122"/>
+              <a:cs typeface="Arial" panose="020B0604020202020204" pitchFamily="34" charset="0"/>
+            </a:endParaRPr>
           </a:p>
         </p:txBody>
       </p:sp>
     </p:spTree>
     <p:extLst>
       <p:ext uri="{BB962C8B-B14F-4D97-AF65-F5344CB8AC3E}">
-        <p14:creationId xmlns:p14="http://schemas.microsoft.com/office/powerpoint/2010/main" val="2898061056"/>
+        <p14:creationId xmlns:p14="http://schemas.microsoft.com/office/powerpoint/2010/main" val="1226717112"/>
+      </p:ext>
+    </p:extLst>
+  </p:cSld>
+  <p:clrMapOvr>
+    <a:masterClrMapping/>
+  </p:clrMapOvr>
+</p:sld>
+</file>
+
+<file path=ppt/slides/slide19.xml><?xml version="1.0" encoding="utf-8"?>
+<p:sld xmlns:a="http://schemas.openxmlformats.org/drawingml/2006/main" xmlns:r="http://schemas.openxmlformats.org/officeDocument/2006/relationships" xmlns:p="http://schemas.openxmlformats.org/presentationml/2006/main">
+  <p:cSld>
+    <p:spTree>
+      <p:nvGrpSpPr>
+        <p:cNvPr id="1" name=""/>
+        <p:cNvGrpSpPr/>
+        <p:nvPr/>
+      </p:nvGrpSpPr>
+      <p:grpSpPr>
+        <a:xfrm>
+          <a:off x="0" y="0"/>
+          <a:ext cx="0" cy="0"/>
+          <a:chOff x="0" y="0"/>
+          <a:chExt cx="0" cy="0"/>
+        </a:xfrm>
+      </p:grpSpPr>
+      <p:pic>
+        <p:nvPicPr>
+          <p:cNvPr id="4" name="Picture 3">
+            <a:extLst>
+              <a:ext uri="{FF2B5EF4-FFF2-40B4-BE49-F238E27FC236}">
+                <a16:creationId xmlns:a16="http://schemas.microsoft.com/office/drawing/2014/main" id="{DF78A328-D018-4A6D-8C22-D77A438A0D81}"/>
+              </a:ext>
+            </a:extLst>
+          </p:cNvPr>
+          <p:cNvPicPr>
+            <a:picLocks noChangeAspect="1"/>
+          </p:cNvPicPr>
+          <p:nvPr/>
+        </p:nvPicPr>
+        <p:blipFill rotWithShape="1">
+          <a:blip r:embed="rId2"/>
+          <a:srcRect t="193" b="-1"/>
+          <a:stretch/>
+        </p:blipFill>
+        <p:spPr>
+          <a:xfrm>
+            <a:off x="4680065" y="987301"/>
+            <a:ext cx="7090064" cy="4501738"/>
+          </a:xfrm>
+          <a:prstGeom prst="rect">
+            <a:avLst/>
+          </a:prstGeom>
+        </p:spPr>
+      </p:pic>
+      <p:sp>
+        <p:nvSpPr>
+          <p:cNvPr id="6" name="TextBox 5">
+            <a:extLst>
+              <a:ext uri="{FF2B5EF4-FFF2-40B4-BE49-F238E27FC236}">
+                <a16:creationId xmlns:a16="http://schemas.microsoft.com/office/drawing/2014/main" id="{E699C575-3880-407F-B546-A430F5638AAB}"/>
+              </a:ext>
+            </a:extLst>
+          </p:cNvPr>
+          <p:cNvSpPr txBox="1"/>
+          <p:nvPr/>
+        </p:nvSpPr>
+        <p:spPr>
+          <a:xfrm>
+            <a:off x="421871" y="1399733"/>
+            <a:ext cx="4108566" cy="1877437"/>
+          </a:xfrm>
+          <a:prstGeom prst="rect">
+            <a:avLst/>
+          </a:prstGeom>
+          <a:noFill/>
+        </p:spPr>
+        <p:txBody>
+          <a:bodyPr wrap="square">
+            <a:spAutoFit/>
+          </a:bodyPr>
+          <a:lstStyle/>
+          <a:p>
+            <a:pPr marR="0" lvl="0" algn="l" defTabSz="914400" rtl="0" eaLnBrk="0" fontAlgn="base" latinLnBrk="0" hangingPunct="0">
+              <a:lnSpc>
+                <a:spcPct val="100000"/>
+              </a:lnSpc>
+              <a:spcBef>
+                <a:spcPct val="0"/>
+              </a:spcBef>
+              <a:spcAft>
+                <a:spcPct val="0"/>
+              </a:spcAft>
+              <a:buClrTx/>
+              <a:buSzTx/>
+              <a:tabLst/>
+            </a:pPr>
+            <a:r>
+              <a:rPr lang="en-US" altLang="en-US" sz="3600" dirty="0">
+                <a:effectLst>
+                  <a:outerShdw blurRad="38100" dist="38100" dir="2700000" algn="tl">
+                    <a:srgbClr val="000000">
+                      <a:alpha val="43137"/>
+                    </a:srgbClr>
+                  </a:outerShdw>
+                </a:effectLst>
+                <a:ea typeface="DengXian Light" panose="02010600030101010101" pitchFamily="2" charset="-122"/>
+                <a:cs typeface="Times New Roman" panose="02020603050405020304" pitchFamily="18" charset="0"/>
+              </a:rPr>
+              <a:t>Format</a:t>
+            </a:r>
+          </a:p>
+          <a:p>
+            <a:pPr marL="742950" lvl="1" indent="-285750" eaLnBrk="0" fontAlgn="base" hangingPunct="0">
+              <a:spcBef>
+                <a:spcPct val="0"/>
+              </a:spcBef>
+              <a:spcAft>
+                <a:spcPct val="0"/>
+              </a:spcAft>
+              <a:buFont typeface="Arial" panose="020B0604020202020204" pitchFamily="34" charset="0"/>
+              <a:buChar char="•"/>
+            </a:pPr>
+            <a:r>
+              <a:rPr lang="en-US" altLang="en-US" sz="2000" dirty="0">
+                <a:effectLst>
+                  <a:outerShdw blurRad="38100" dist="38100" dir="2700000" algn="tl">
+                    <a:srgbClr val="000000">
+                      <a:alpha val="43137"/>
+                    </a:srgbClr>
+                  </a:outerShdw>
+                </a:effectLst>
+                <a:ea typeface="DengXian Light" panose="02010600030101010101" pitchFamily="2" charset="-122"/>
+                <a:cs typeface="Times New Roman" panose="02020603050405020304" pitchFamily="18" charset="0"/>
+              </a:rPr>
+              <a:t>Font – the change default font of the text</a:t>
+            </a:r>
+          </a:p>
+          <a:p>
+            <a:pPr marL="742950" lvl="1" indent="-285750" eaLnBrk="0" fontAlgn="base" hangingPunct="0">
+              <a:spcBef>
+                <a:spcPct val="0"/>
+              </a:spcBef>
+              <a:spcAft>
+                <a:spcPct val="0"/>
+              </a:spcAft>
+              <a:buFont typeface="Arial" panose="020B0604020202020204" pitchFamily="34" charset="0"/>
+              <a:buChar char="•"/>
+            </a:pPr>
+            <a:r>
+              <a:rPr lang="en-US" altLang="en-US" sz="2000" dirty="0">
+                <a:effectLst>
+                  <a:outerShdw blurRad="38100" dist="38100" dir="2700000" algn="tl">
+                    <a:srgbClr val="000000">
+                      <a:alpha val="43137"/>
+                    </a:srgbClr>
+                  </a:outerShdw>
+                </a:effectLst>
+                <a:ea typeface="DengXian Light" panose="02010600030101010101" pitchFamily="2" charset="-122"/>
+                <a:cs typeface="Times New Roman" panose="02020603050405020304" pitchFamily="18" charset="0"/>
+              </a:rPr>
+              <a:t>Color – to change default color of the text </a:t>
+            </a:r>
+          </a:p>
+        </p:txBody>
+      </p:sp>
+      <p:sp>
+        <p:nvSpPr>
+          <p:cNvPr id="7" name="TextBox 6">
+            <a:extLst>
+              <a:ext uri="{FF2B5EF4-FFF2-40B4-BE49-F238E27FC236}">
+                <a16:creationId xmlns:a16="http://schemas.microsoft.com/office/drawing/2014/main" id="{6AC3F664-0F98-49CF-94CF-8CB6B9AB6848}"/>
+              </a:ext>
+            </a:extLst>
+          </p:cNvPr>
+          <p:cNvSpPr txBox="1"/>
+          <p:nvPr/>
+        </p:nvSpPr>
+        <p:spPr>
+          <a:xfrm>
+            <a:off x="-636333" y="6394878"/>
+            <a:ext cx="6097554" cy="374783"/>
+          </a:xfrm>
+          <a:prstGeom prst="rect">
+            <a:avLst/>
+          </a:prstGeom>
+          <a:noFill/>
+        </p:spPr>
+        <p:txBody>
+          <a:bodyPr wrap="square">
+            <a:spAutoFit/>
+          </a:bodyPr>
+          <a:lstStyle/>
+          <a:p>
+            <a:pPr algn="ctr">
+              <a:lnSpc>
+                <a:spcPct val="107000"/>
+              </a:lnSpc>
+              <a:spcAft>
+                <a:spcPts val="800"/>
+              </a:spcAft>
+            </a:pPr>
+            <a:r>
+              <a:rPr lang="en-US" sz="1800" dirty="0">
+                <a:solidFill>
+                  <a:schemeClr val="tx1">
+                    <a:lumMod val="50000"/>
+                    <a:lumOff val="50000"/>
+                  </a:schemeClr>
+                </a:solidFill>
+                <a:effectLst/>
+                <a:latin typeface="Abadi" panose="020B0604020104020204" pitchFamily="34" charset="0"/>
+                <a:ea typeface="DengXian" panose="02010600030101010101" pitchFamily="2" charset="-122"/>
+                <a:cs typeface="Arial" panose="020B0604020202020204" pitchFamily="34" charset="0"/>
+              </a:rPr>
+              <a:t>Vanier College</a:t>
+            </a:r>
+            <a:r>
+              <a:rPr lang="en-US" sz="1100" dirty="0">
+                <a:solidFill>
+                  <a:schemeClr val="tx1">
+                    <a:lumMod val="50000"/>
+                    <a:lumOff val="50000"/>
+                  </a:schemeClr>
+                </a:solidFill>
+                <a:latin typeface="Abadi" panose="020B0604020104020204" pitchFamily="34" charset="0"/>
+                <a:ea typeface="DengXian" panose="02010600030101010101" pitchFamily="2" charset="-122"/>
+                <a:cs typeface="Arial" panose="020B0604020202020204" pitchFamily="34" charset="0"/>
+              </a:rPr>
+              <a:t> </a:t>
+            </a:r>
+            <a:r>
+              <a:rPr lang="en-US" sz="1800" dirty="0">
+                <a:solidFill>
+                  <a:schemeClr val="tx1">
+                    <a:lumMod val="50000"/>
+                    <a:lumOff val="50000"/>
+                  </a:schemeClr>
+                </a:solidFill>
+                <a:effectLst/>
+                <a:latin typeface="Abadi" panose="020B0604020104020204" pitchFamily="34" charset="0"/>
+                <a:ea typeface="DengXian" panose="02010600030101010101" pitchFamily="2" charset="-122"/>
+                <a:cs typeface="Arial" panose="020B0604020202020204" pitchFamily="34" charset="0"/>
+              </a:rPr>
+              <a:t>Computer Science Department</a:t>
+            </a:r>
+            <a:endParaRPr lang="en-US" sz="1100" dirty="0">
+              <a:solidFill>
+                <a:schemeClr val="tx1">
+                  <a:lumMod val="50000"/>
+                  <a:lumOff val="50000"/>
+                </a:schemeClr>
+              </a:solidFill>
+              <a:effectLst/>
+              <a:latin typeface="Abadi" panose="020B0604020104020204" pitchFamily="34" charset="0"/>
+              <a:ea typeface="DengXian" panose="02010600030101010101" pitchFamily="2" charset="-122"/>
+              <a:cs typeface="Arial" panose="020B0604020202020204" pitchFamily="34" charset="0"/>
+            </a:endParaRPr>
+          </a:p>
+        </p:txBody>
+      </p:sp>
+    </p:spTree>
+    <p:extLst>
+      <p:ext uri="{BB962C8B-B14F-4D97-AF65-F5344CB8AC3E}">
+        <p14:creationId xmlns:p14="http://schemas.microsoft.com/office/powerpoint/2010/main" val="2691743917"/>
       </p:ext>
     </p:extLst>
   </p:cSld>
@@ -11493,6 +12359,364 @@
     <p:extLst>
       <p:ext uri="{BB962C8B-B14F-4D97-AF65-F5344CB8AC3E}">
         <p14:creationId xmlns:p14="http://schemas.microsoft.com/office/powerpoint/2010/main" val="2727343056"/>
+      </p:ext>
+    </p:extLst>
+  </p:cSld>
+  <p:clrMapOvr>
+    <a:masterClrMapping/>
+  </p:clrMapOvr>
+</p:sld>
+</file>
+
+<file path=ppt/slides/slide20.xml><?xml version="1.0" encoding="utf-8"?>
+<p:sld xmlns:a="http://schemas.openxmlformats.org/drawingml/2006/main" xmlns:r="http://schemas.openxmlformats.org/officeDocument/2006/relationships" xmlns:p="http://schemas.openxmlformats.org/presentationml/2006/main">
+  <p:cSld>
+    <p:spTree>
+      <p:nvGrpSpPr>
+        <p:cNvPr id="1" name=""/>
+        <p:cNvGrpSpPr/>
+        <p:nvPr/>
+      </p:nvGrpSpPr>
+      <p:grpSpPr>
+        <a:xfrm>
+          <a:off x="0" y="0"/>
+          <a:ext cx="0" cy="0"/>
+          <a:chOff x="0" y="0"/>
+          <a:chExt cx="0" cy="0"/>
+        </a:xfrm>
+      </p:grpSpPr>
+      <p:sp>
+        <p:nvSpPr>
+          <p:cNvPr id="11" name="TextBox 10">
+            <a:extLst>
+              <a:ext uri="{FF2B5EF4-FFF2-40B4-BE49-F238E27FC236}">
+                <a16:creationId xmlns:a16="http://schemas.microsoft.com/office/drawing/2014/main" id="{CD8B058F-67DF-4D09-8F9F-3A14D5F41538}"/>
+              </a:ext>
+            </a:extLst>
+          </p:cNvPr>
+          <p:cNvSpPr txBox="1"/>
+          <p:nvPr/>
+        </p:nvSpPr>
+        <p:spPr>
+          <a:xfrm>
+            <a:off x="-162508" y="6120559"/>
+            <a:ext cx="6097554" cy="374783"/>
+          </a:xfrm>
+          <a:prstGeom prst="rect">
+            <a:avLst/>
+          </a:prstGeom>
+          <a:noFill/>
+        </p:spPr>
+        <p:txBody>
+          <a:bodyPr wrap="square">
+            <a:spAutoFit/>
+          </a:bodyPr>
+          <a:lstStyle/>
+          <a:p>
+            <a:pPr algn="ctr">
+              <a:lnSpc>
+                <a:spcPct val="107000"/>
+              </a:lnSpc>
+              <a:spcAft>
+                <a:spcPts val="800"/>
+              </a:spcAft>
+            </a:pPr>
+            <a:r>
+              <a:rPr lang="en-US" sz="1800" dirty="0">
+                <a:solidFill>
+                  <a:schemeClr val="tx1">
+                    <a:lumMod val="50000"/>
+                    <a:lumOff val="50000"/>
+                  </a:schemeClr>
+                </a:solidFill>
+                <a:effectLst/>
+                <a:latin typeface="Abadi" panose="020B0604020104020204" pitchFamily="34" charset="0"/>
+                <a:ea typeface="DengXian" panose="02010600030101010101" pitchFamily="2" charset="-122"/>
+                <a:cs typeface="Arial" panose="020B0604020202020204" pitchFamily="34" charset="0"/>
+              </a:rPr>
+              <a:t>Vanier College</a:t>
+            </a:r>
+            <a:r>
+              <a:rPr lang="en-US" sz="1100" dirty="0">
+                <a:solidFill>
+                  <a:schemeClr val="tx1">
+                    <a:lumMod val="50000"/>
+                    <a:lumOff val="50000"/>
+                  </a:schemeClr>
+                </a:solidFill>
+                <a:latin typeface="Abadi" panose="020B0604020104020204" pitchFamily="34" charset="0"/>
+                <a:ea typeface="DengXian" panose="02010600030101010101" pitchFamily="2" charset="-122"/>
+                <a:cs typeface="Arial" panose="020B0604020202020204" pitchFamily="34" charset="0"/>
+              </a:rPr>
+              <a:t> </a:t>
+            </a:r>
+            <a:r>
+              <a:rPr lang="en-US" sz="1800" dirty="0">
+                <a:solidFill>
+                  <a:schemeClr val="tx1">
+                    <a:lumMod val="50000"/>
+                    <a:lumOff val="50000"/>
+                  </a:schemeClr>
+                </a:solidFill>
+                <a:effectLst/>
+                <a:latin typeface="Abadi" panose="020B0604020104020204" pitchFamily="34" charset="0"/>
+                <a:ea typeface="DengXian" panose="02010600030101010101" pitchFamily="2" charset="-122"/>
+                <a:cs typeface="Arial" panose="020B0604020202020204" pitchFamily="34" charset="0"/>
+              </a:rPr>
+              <a:t>Computer Science Department</a:t>
+            </a:r>
+            <a:endParaRPr lang="en-US" sz="1100" dirty="0">
+              <a:solidFill>
+                <a:schemeClr val="tx1">
+                  <a:lumMod val="50000"/>
+                  <a:lumOff val="50000"/>
+                </a:schemeClr>
+              </a:solidFill>
+              <a:effectLst/>
+              <a:latin typeface="Abadi" panose="020B0604020104020204" pitchFamily="34" charset="0"/>
+              <a:ea typeface="DengXian" panose="02010600030101010101" pitchFamily="2" charset="-122"/>
+              <a:cs typeface="Arial" panose="020B0604020202020204" pitchFamily="34" charset="0"/>
+            </a:endParaRPr>
+          </a:p>
+        </p:txBody>
+      </p:sp>
+      <p:sp>
+        <p:nvSpPr>
+          <p:cNvPr id="3" name="Rectangle 3">
+            <a:extLst>
+              <a:ext uri="{FF2B5EF4-FFF2-40B4-BE49-F238E27FC236}">
+                <a16:creationId xmlns:a16="http://schemas.microsoft.com/office/drawing/2014/main" id="{6ACAD754-04BC-48CD-97DA-931BFB570C41}"/>
+              </a:ext>
+            </a:extLst>
+          </p:cNvPr>
+          <p:cNvSpPr>
+            <a:spLocks noChangeArrowheads="1"/>
+          </p:cNvSpPr>
+          <p:nvPr/>
+        </p:nvSpPr>
+        <p:spPr bwMode="auto">
+          <a:xfrm>
+            <a:off x="2369976" y="3798660"/>
+            <a:ext cx="8450424" cy="45719"/>
+          </a:xfrm>
+          <a:prstGeom prst="rect">
+            <a:avLst/>
+          </a:prstGeom>
+          <a:noFill/>
+          <a:ln>
+            <a:noFill/>
+          </a:ln>
+          <a:effectLst/>
+          <a:extLst>
+            <a:ext uri="{909E8E84-426E-40DD-AFC4-6F175D3DCCD1}">
+              <a14:hiddenFill xmlns:a14="http://schemas.microsoft.com/office/drawing/2010/main">
+                <a:solidFill>
+                  <a:schemeClr val="accent1"/>
+                </a:solidFill>
+              </a14:hiddenFill>
+            </a:ext>
+            <a:ext uri="{91240B29-F687-4F45-9708-019B960494DF}">
+              <a14:hiddenLine xmlns:a14="http://schemas.microsoft.com/office/drawing/2010/main" w="9525">
+                <a:solidFill>
+                  <a:schemeClr val="tx1"/>
+                </a:solidFill>
+                <a:miter lim="800000"/>
+                <a:headEnd/>
+                <a:tailEnd/>
+              </a14:hiddenLine>
+            </a:ext>
+            <a:ext uri="{AF507438-7753-43E0-B8FC-AC1667EBCBE1}">
+              <a14:hiddenEffects xmlns:a14="http://schemas.microsoft.com/office/drawing/2010/main">
+                <a:effectLst>
+                  <a:outerShdw dist="35921" dir="2700000" algn="ctr" rotWithShape="0">
+                    <a:schemeClr val="bg2"/>
+                  </a:outerShdw>
+                </a:effectLst>
+              </a14:hiddenEffects>
+            </a:ext>
+          </a:extLst>
+        </p:spPr>
+        <p:txBody>
+          <a:bodyPr vert="horz" wrap="square" lIns="91440" tIns="45720" rIns="91440" bIns="45720" numCol="1" anchor="ctr" anchorCtr="0" compatLnSpc="1">
+            <a:prstTxWarp prst="textNoShape">
+              <a:avLst/>
+            </a:prstTxWarp>
+            <a:spAutoFit/>
+          </a:bodyPr>
+          <a:lstStyle/>
+          <a:p>
+            <a:endParaRPr lang="en-US"/>
+          </a:p>
+        </p:txBody>
+      </p:sp>
+      <p:sp>
+        <p:nvSpPr>
+          <p:cNvPr id="2" name="Rectangle 2">
+            <a:extLst>
+              <a:ext uri="{FF2B5EF4-FFF2-40B4-BE49-F238E27FC236}">
+                <a16:creationId xmlns:a16="http://schemas.microsoft.com/office/drawing/2014/main" id="{DB30CECD-8F7F-4342-8063-840C3A98EF28}"/>
+              </a:ext>
+            </a:extLst>
+          </p:cNvPr>
+          <p:cNvSpPr>
+            <a:spLocks noChangeArrowheads="1"/>
+          </p:cNvSpPr>
+          <p:nvPr/>
+        </p:nvSpPr>
+        <p:spPr bwMode="auto">
+          <a:xfrm>
+            <a:off x="1551213" y="2505342"/>
+            <a:ext cx="8563170" cy="1107996"/>
+          </a:xfrm>
+          <a:prstGeom prst="rect">
+            <a:avLst/>
+          </a:prstGeom>
+          <a:solidFill>
+            <a:schemeClr val="accent1">
+              <a:lumMod val="75000"/>
+            </a:schemeClr>
+          </a:solidFill>
+          <a:ln>
+            <a:noFill/>
+          </a:ln>
+          <a:effectLst/>
+        </p:spPr>
+        <p:txBody>
+          <a:bodyPr vert="horz" wrap="square" lIns="91440" tIns="45720" rIns="91440" bIns="45720" numCol="1" anchor="ctr" anchorCtr="0" compatLnSpc="1">
+            <a:prstTxWarp prst="textNoShape">
+              <a:avLst/>
+            </a:prstTxWarp>
+            <a:spAutoFit/>
+          </a:bodyPr>
+          <a:lstStyle/>
+          <a:p>
+            <a:pPr marL="0" marR="0" lvl="0" indent="0" algn="l" defTabSz="914400" rtl="0" eaLnBrk="0" fontAlgn="base" latinLnBrk="0" hangingPunct="0">
+              <a:lnSpc>
+                <a:spcPct val="100000"/>
+              </a:lnSpc>
+              <a:spcBef>
+                <a:spcPct val="0"/>
+              </a:spcBef>
+              <a:spcAft>
+                <a:spcPct val="0"/>
+              </a:spcAft>
+              <a:buClrTx/>
+              <a:buSzTx/>
+              <a:buFontTx/>
+              <a:buNone/>
+              <a:tabLst/>
+            </a:pPr>
+            <a:r>
+              <a:rPr kumimoji="0" lang="en-US" altLang="en-US" sz="6600" b="0" i="0" u="none" strike="noStrike" cap="none" normalizeH="0" baseline="0" dirty="0">
+                <a:ln>
+                  <a:noFill/>
+                </a:ln>
+                <a:solidFill>
+                  <a:srgbClr val="E4B194"/>
+                </a:solidFill>
+                <a:effectLst/>
+                <a:ea typeface="DengXian" panose="02010600030101010101" pitchFamily="2" charset="-122"/>
+                <a:cs typeface="Calibri" panose="020F0502020204030204" pitchFamily="34" charset="0"/>
+              </a:rPr>
+              <a:t>	  “ </a:t>
+            </a:r>
+            <a:r>
+              <a:rPr kumimoji="0" lang="en-US" altLang="en-US" sz="6600" b="0" i="0" u="none" strike="noStrike" cap="none" normalizeH="0" baseline="0" dirty="0">
+                <a:ln>
+                  <a:noFill/>
+                </a:ln>
+                <a:solidFill>
+                  <a:schemeClr val="bg1"/>
+                </a:solidFill>
+                <a:effectLst/>
+                <a:latin typeface="Arial Black" panose="020B0A04020102020204" pitchFamily="34" charset="0"/>
+                <a:ea typeface="DengXian" panose="02010600030101010101" pitchFamily="2" charset="-122"/>
+                <a:cs typeface="Calibri" panose="020F0502020204030204" pitchFamily="34" charset="0"/>
+              </a:rPr>
+              <a:t>Thank You </a:t>
+            </a:r>
+            <a:r>
+              <a:rPr kumimoji="0" lang="en-US" altLang="en-US" sz="6600" b="0" i="0" u="none" strike="noStrike" cap="none" normalizeH="0" baseline="0" dirty="0">
+                <a:ln>
+                  <a:noFill/>
+                </a:ln>
+                <a:solidFill>
+                  <a:srgbClr val="E4B194"/>
+                </a:solidFill>
+                <a:effectLst/>
+                <a:ea typeface="DengXian" panose="02010600030101010101" pitchFamily="2" charset="-122"/>
+                <a:cs typeface="Calibri" panose="020F0502020204030204" pitchFamily="34" charset="0"/>
+              </a:rPr>
+              <a:t>”</a:t>
+            </a:r>
+            <a:endParaRPr kumimoji="0" lang="en-US" altLang="en-US" sz="4000" b="0" i="0" u="none" strike="noStrike" cap="none" normalizeH="0" baseline="0" dirty="0">
+              <a:ln>
+                <a:noFill/>
+              </a:ln>
+              <a:solidFill>
+                <a:srgbClr val="E4B194"/>
+              </a:solidFill>
+              <a:effectLst/>
+            </a:endParaRPr>
+          </a:p>
+        </p:txBody>
+      </p:sp>
+      <p:sp>
+        <p:nvSpPr>
+          <p:cNvPr id="6" name="Rectangle 5">
+            <a:extLst>
+              <a:ext uri="{FF2B5EF4-FFF2-40B4-BE49-F238E27FC236}">
+                <a16:creationId xmlns:a16="http://schemas.microsoft.com/office/drawing/2014/main" id="{C5D34516-6D94-4451-A0D4-5473019DEE56}"/>
+              </a:ext>
+            </a:extLst>
+          </p:cNvPr>
+          <p:cNvSpPr/>
+          <p:nvPr/>
+        </p:nvSpPr>
+        <p:spPr>
+          <a:xfrm>
+            <a:off x="354563" y="223316"/>
+            <a:ext cx="11430001" cy="6411367"/>
+          </a:xfrm>
+          <a:prstGeom prst="rect">
+            <a:avLst/>
+          </a:prstGeom>
+          <a:noFill/>
+          <a:ln w="76200">
+            <a:solidFill>
+              <a:srgbClr val="CBBA99"/>
+            </a:solidFill>
+          </a:ln>
+        </p:spPr>
+        <p:style>
+          <a:lnRef idx="2">
+            <a:schemeClr val="accent1">
+              <a:shade val="50000"/>
+            </a:schemeClr>
+          </a:lnRef>
+          <a:fillRef idx="1">
+            <a:schemeClr val="accent1"/>
+          </a:fillRef>
+          <a:effectRef idx="0">
+            <a:schemeClr val="accent1"/>
+          </a:effectRef>
+          <a:fontRef idx="minor">
+            <a:schemeClr val="lt1"/>
+          </a:fontRef>
+        </p:style>
+        <p:txBody>
+          <a:bodyPr rtlCol="0" anchor="ctr"/>
+          <a:lstStyle/>
+          <a:p>
+            <a:pPr algn="ctr"/>
+            <a:endParaRPr lang="en-US"/>
+          </a:p>
+        </p:txBody>
+      </p:sp>
+    </p:spTree>
+    <p:extLst>
+      <p:ext uri="{BB962C8B-B14F-4D97-AF65-F5344CB8AC3E}">
+        <p14:creationId xmlns:p14="http://schemas.microsoft.com/office/powerpoint/2010/main" val="2898061056"/>
       </p:ext>
     </p:extLst>
   </p:cSld>

</xml_diff>